<commit_message>
Update title of Quick Review and fix spacing problem on Refactoring entry
</commit_message>
<xml_diff>
--- a/presentations/agenda-master.pptx
+++ b/presentations/agenda-master.pptx
@@ -12,16 +12,16 @@
   </p:handoutMasterIdLst>
   <p:sldIdLst>
     <p:sldId id="257" r:id="rId5"/>
-    <p:sldId id="262" r:id="rId6"/>
-    <p:sldId id="263" r:id="rId7"/>
-    <p:sldId id="264" r:id="rId8"/>
-    <p:sldId id="265" r:id="rId9"/>
-    <p:sldId id="266" r:id="rId10"/>
-    <p:sldId id="267" r:id="rId11"/>
-    <p:sldId id="268" r:id="rId12"/>
-    <p:sldId id="269" r:id="rId13"/>
-    <p:sldId id="270" r:id="rId14"/>
-    <p:sldId id="271" r:id="rId15"/>
+    <p:sldId id="273" r:id="rId6"/>
+    <p:sldId id="274" r:id="rId7"/>
+    <p:sldId id="275" r:id="rId8"/>
+    <p:sldId id="276" r:id="rId9"/>
+    <p:sldId id="277" r:id="rId10"/>
+    <p:sldId id="278" r:id="rId11"/>
+    <p:sldId id="279" r:id="rId12"/>
+    <p:sldId id="280" r:id="rId13"/>
+    <p:sldId id="281" r:id="rId14"/>
+    <p:sldId id="282" r:id="rId15"/>
   </p:sldIdLst>
   <p:sldSz cx="12188825" cy="6858000"/>
   <p:notesSz cx="7010400" cy="9296400"/>
@@ -265,7 +265,7 @@
           <a:p>
             <a:fld id="{0B842F42-2CE9-4E35-95C1-410DC08A50B1}" type="datetimeFigureOut">
               <a:rPr lang="en-US" smtClean="0"/>
-              <a:t>8/2/2020</a:t>
+              <a:t>8/3/2020</a:t>
             </a:fld>
             <a:endParaRPr lang="en-US"/>
           </a:p>
@@ -430,7 +430,7 @@
           <a:p>
             <a:fld id="{6F282904-F315-4730-8D91-37D99E141A6F}" type="datetimeFigureOut">
               <a:rPr lang="en-US" smtClean="0"/>
-              <a:t>8/2/2020</a:t>
+              <a:t>8/3/2020</a:t>
             </a:fld>
             <a:endParaRPr lang="en-US"/>
           </a:p>
@@ -3581,14 +3581,14 @@
             <p:ph idx="1"/>
             <p:extLst>
               <p:ext uri="{D42A27DB-BD31-4B8C-83A1-F6EECF244321}">
-                <p14:modId xmlns:p14="http://schemas.microsoft.com/office/powerpoint/2010/main" val="3559670886"/>
+                <p14:modId xmlns:p14="http://schemas.microsoft.com/office/powerpoint/2010/main" val="3517278051"/>
               </p:ext>
             </p:extLst>
           </p:nvPr>
         </p:nvGraphicFramePr>
         <p:xfrm>
           <a:off x="530679" y="879117"/>
-          <a:ext cx="11127467" cy="5770880"/>
+          <a:ext cx="11127467" cy="5562600"/>
         </p:xfrm>
         <a:graphic>
           <a:graphicData uri="http://schemas.openxmlformats.org/drawingml/2006/table">
@@ -4014,7 +4014,7 @@
                       </a:pPr>
                       <a:r>
                         <a:rPr lang="en-US" sz="1600" dirty="0"/>
-                        <a:t>Agile Project Management</a:t>
+                        <a:t>Agile Methodologies</a:t>
                       </a:r>
                     </a:p>
                   </a:txBody>
@@ -4673,7 +4673,7 @@
                       </a:pPr>
                       <a:r>
                         <a:rPr lang="en-US" sz="1600" i="0" dirty="0"/>
-                        <a:t>Quick Review</a:t>
+                        <a:t>Agile Methodologies Redux</a:t>
                       </a:r>
                     </a:p>
                   </a:txBody>
@@ -4801,14 +4801,6 @@
                         </a:rPr>
                         <a:t>Anshu Dubey, ANL</a:t>
                       </a:r>
-                    </a:p>
-                    <a:p>
-                      <a:pPr>
-                        <a:lnSpc>
-                          <a:spcPct val="100000"/>
-                        </a:lnSpc>
-                      </a:pPr>
-                      <a:endParaRPr lang="en-US" sz="1600" dirty="0"/>
                     </a:p>
                   </a:txBody>
                   <a:tcPr/>
@@ -5244,7 +5236,7 @@
         </p:nvGraphicFramePr>
         <p:xfrm>
           <a:off x="530679" y="879117"/>
-          <a:ext cx="11127467" cy="5770880"/>
+          <a:ext cx="11127467" cy="5562600"/>
         </p:xfrm>
         <a:graphic>
           <a:graphicData uri="http://schemas.openxmlformats.org/drawingml/2006/table">
@@ -5670,7 +5662,7 @@
                       </a:pPr>
                       <a:r>
                         <a:rPr lang="en-US" sz="1600" dirty="0"/>
-                        <a:t>Agile Project Management</a:t>
+                        <a:t>Agile Methodologies</a:t>
                       </a:r>
                     </a:p>
                   </a:txBody>
@@ -6329,7 +6321,7 @@
                       </a:pPr>
                       <a:r>
                         <a:rPr lang="en-US" sz="1600" i="0" dirty="0"/>
-                        <a:t>Quick Review</a:t>
+                        <a:t>Agile Methodologies Redux</a:t>
                       </a:r>
                     </a:p>
                   </a:txBody>
@@ -6457,14 +6449,6 @@
                         </a:rPr>
                         <a:t>Anshu Dubey, ANL</a:t>
                       </a:r>
-                    </a:p>
-                    <a:p>
-                      <a:pPr>
-                        <a:lnSpc>
-                          <a:spcPct val="100000"/>
-                        </a:lnSpc>
-                      </a:pPr>
-                      <a:endParaRPr lang="en-US" sz="1600" dirty="0"/>
                     </a:p>
                   </a:txBody>
                   <a:tcPr/>
@@ -6829,7 +6813,7 @@
           <p:cNvPr id="5" name="Group 4">
             <a:extLst>
               <a:ext uri="{FF2B5EF4-FFF2-40B4-BE49-F238E27FC236}">
-                <a16:creationId xmlns:a16="http://schemas.microsoft.com/office/drawing/2014/main" id="{809FFEAE-C12B-438A-B836-74C883AB9C0B}"/>
+                <a16:creationId xmlns:a16="http://schemas.microsoft.com/office/drawing/2014/main" id="{1E432556-E434-4E1C-BF45-B1AFC4484FCE}"/>
               </a:ext>
             </a:extLst>
           </p:cNvPr>
@@ -6838,7 +6822,7 @@
         </p:nvGrpSpPr>
         <p:grpSpPr>
           <a:xfrm>
-            <a:off x="79513" y="5685575"/>
+            <a:off x="79513" y="5477471"/>
             <a:ext cx="12029799" cy="390939"/>
             <a:chOff x="79513" y="1653208"/>
             <a:chExt cx="12029799" cy="390939"/>
@@ -6849,7 +6833,7 @@
             <p:cNvPr id="6" name="Straight Connector 5">
               <a:extLst>
                 <a:ext uri="{FF2B5EF4-FFF2-40B4-BE49-F238E27FC236}">
-                  <a16:creationId xmlns:a16="http://schemas.microsoft.com/office/drawing/2014/main" id="{FD616130-498B-49A1-B567-D4EEE4169280}"/>
+                  <a16:creationId xmlns:a16="http://schemas.microsoft.com/office/drawing/2014/main" id="{9AA33DBE-3BD6-492A-8E9C-70D4DB3E9C16}"/>
                 </a:ext>
               </a:extLst>
             </p:cNvPr>
@@ -6890,7 +6874,7 @@
             <p:cNvPr id="7" name="Arrow: Right 7">
               <a:extLst>
                 <a:ext uri="{FF2B5EF4-FFF2-40B4-BE49-F238E27FC236}">
-                  <a16:creationId xmlns:a16="http://schemas.microsoft.com/office/drawing/2014/main" id="{C101D39A-EE8D-4630-8550-D66D60889E67}"/>
+                  <a16:creationId xmlns:a16="http://schemas.microsoft.com/office/drawing/2014/main" id="{957A1BD6-3A70-4C4B-AEC3-852CA4552EED}"/>
                 </a:ext>
               </a:extLst>
             </p:cNvPr>
@@ -6965,7 +6949,7 @@
             <p:cNvPr id="8" name="Arrow: Right 8">
               <a:extLst>
                 <a:ext uri="{FF2B5EF4-FFF2-40B4-BE49-F238E27FC236}">
-                  <a16:creationId xmlns:a16="http://schemas.microsoft.com/office/drawing/2014/main" id="{33F3DD26-6611-437C-9431-E9A118F1F3AB}"/>
+                  <a16:creationId xmlns:a16="http://schemas.microsoft.com/office/drawing/2014/main" id="{FE4BC733-9F58-4075-B4C7-73715C39DC54}"/>
                 </a:ext>
               </a:extLst>
             </p:cNvPr>
@@ -7039,7 +7023,7 @@
     </p:spTree>
     <p:extLst>
       <p:ext uri="{BB962C8B-B14F-4D97-AF65-F5344CB8AC3E}">
-        <p14:creationId xmlns:p14="http://schemas.microsoft.com/office/powerpoint/2010/main" val="1331638366"/>
+        <p14:creationId xmlns:p14="http://schemas.microsoft.com/office/powerpoint/2010/main" val="40246161"/>
       </p:ext>
     </p:extLst>
   </p:cSld>
@@ -7112,7 +7096,7 @@
         </p:nvGraphicFramePr>
         <p:xfrm>
           <a:off x="530679" y="879117"/>
-          <a:ext cx="11127467" cy="5770880"/>
+          <a:ext cx="11127467" cy="5562600"/>
         </p:xfrm>
         <a:graphic>
           <a:graphicData uri="http://schemas.openxmlformats.org/drawingml/2006/table">
@@ -7538,7 +7522,7 @@
                       </a:pPr>
                       <a:r>
                         <a:rPr lang="en-US" sz="1600" dirty="0"/>
-                        <a:t>Agile Project Management</a:t>
+                        <a:t>Agile Methodologies</a:t>
                       </a:r>
                     </a:p>
                   </a:txBody>
@@ -8197,7 +8181,7 @@
                       </a:pPr>
                       <a:r>
                         <a:rPr lang="en-US" sz="1600" i="0" dirty="0"/>
-                        <a:t>Quick Review</a:t>
+                        <a:t>Agile Methodologies Redux</a:t>
                       </a:r>
                     </a:p>
                   </a:txBody>
@@ -8325,14 +8309,6 @@
                         </a:rPr>
                         <a:t>Anshu Dubey, ANL</a:t>
                       </a:r>
-                    </a:p>
-                    <a:p>
-                      <a:pPr>
-                        <a:lnSpc>
-                          <a:spcPct val="100000"/>
-                        </a:lnSpc>
-                      </a:pPr>
-                      <a:endParaRPr lang="en-US" sz="1600" dirty="0"/>
                     </a:p>
                   </a:txBody>
                   <a:tcPr/>
@@ -8697,7 +8673,7 @@
           <p:cNvPr id="5" name="Group 4">
             <a:extLst>
               <a:ext uri="{FF2B5EF4-FFF2-40B4-BE49-F238E27FC236}">
-                <a16:creationId xmlns:a16="http://schemas.microsoft.com/office/drawing/2014/main" id="{809FFEAE-C12B-438A-B836-74C883AB9C0B}"/>
+                <a16:creationId xmlns:a16="http://schemas.microsoft.com/office/drawing/2014/main" id="{1E432556-E434-4E1C-BF45-B1AFC4484FCE}"/>
               </a:ext>
             </a:extLst>
           </p:cNvPr>
@@ -8706,7 +8682,7 @@
         </p:nvGrpSpPr>
         <p:grpSpPr>
           <a:xfrm>
-            <a:off x="79513" y="6101792"/>
+            <a:off x="79513" y="5849540"/>
             <a:ext cx="12029799" cy="390939"/>
             <a:chOff x="79513" y="1653208"/>
             <a:chExt cx="12029799" cy="390939"/>
@@ -8717,7 +8693,7 @@
             <p:cNvPr id="6" name="Straight Connector 5">
               <a:extLst>
                 <a:ext uri="{FF2B5EF4-FFF2-40B4-BE49-F238E27FC236}">
-                  <a16:creationId xmlns:a16="http://schemas.microsoft.com/office/drawing/2014/main" id="{FD616130-498B-49A1-B567-D4EEE4169280}"/>
+                  <a16:creationId xmlns:a16="http://schemas.microsoft.com/office/drawing/2014/main" id="{9AA33DBE-3BD6-492A-8E9C-70D4DB3E9C16}"/>
                 </a:ext>
               </a:extLst>
             </p:cNvPr>
@@ -8758,7 +8734,7 @@
             <p:cNvPr id="7" name="Arrow: Right 7">
               <a:extLst>
                 <a:ext uri="{FF2B5EF4-FFF2-40B4-BE49-F238E27FC236}">
-                  <a16:creationId xmlns:a16="http://schemas.microsoft.com/office/drawing/2014/main" id="{C101D39A-EE8D-4630-8550-D66D60889E67}"/>
+                  <a16:creationId xmlns:a16="http://schemas.microsoft.com/office/drawing/2014/main" id="{957A1BD6-3A70-4C4B-AEC3-852CA4552EED}"/>
                 </a:ext>
               </a:extLst>
             </p:cNvPr>
@@ -8833,7 +8809,7 @@
             <p:cNvPr id="8" name="Arrow: Right 8">
               <a:extLst>
                 <a:ext uri="{FF2B5EF4-FFF2-40B4-BE49-F238E27FC236}">
-                  <a16:creationId xmlns:a16="http://schemas.microsoft.com/office/drawing/2014/main" id="{33F3DD26-6611-437C-9431-E9A118F1F3AB}"/>
+                  <a16:creationId xmlns:a16="http://schemas.microsoft.com/office/drawing/2014/main" id="{FE4BC733-9F58-4075-B4C7-73715C39DC54}"/>
                 </a:ext>
               </a:extLst>
             </p:cNvPr>
@@ -8907,7 +8883,7 @@
     </p:spTree>
     <p:extLst>
       <p:ext uri="{BB962C8B-B14F-4D97-AF65-F5344CB8AC3E}">
-        <p14:creationId xmlns:p14="http://schemas.microsoft.com/office/powerpoint/2010/main" val="3951505344"/>
+        <p14:creationId xmlns:p14="http://schemas.microsoft.com/office/powerpoint/2010/main" val="3283453312"/>
       </p:ext>
     </p:extLst>
   </p:cSld>
@@ -8980,7 +8956,7 @@
         </p:nvGraphicFramePr>
         <p:xfrm>
           <a:off x="530679" y="879117"/>
-          <a:ext cx="11127467" cy="5770880"/>
+          <a:ext cx="11127467" cy="5562600"/>
         </p:xfrm>
         <a:graphic>
           <a:graphicData uri="http://schemas.openxmlformats.org/drawingml/2006/table">
@@ -9406,7 +9382,7 @@
                       </a:pPr>
                       <a:r>
                         <a:rPr lang="en-US" sz="1600" dirty="0"/>
-                        <a:t>Agile Project Management</a:t>
+                        <a:t>Agile Methodologies</a:t>
                       </a:r>
                     </a:p>
                   </a:txBody>
@@ -10065,7 +10041,7 @@
                       </a:pPr>
                       <a:r>
                         <a:rPr lang="en-US" sz="1600" i="0" dirty="0"/>
-                        <a:t>Quick Review</a:t>
+                        <a:t>Agile Methodologies Redux</a:t>
                       </a:r>
                     </a:p>
                   </a:txBody>
@@ -10193,14 +10169,6 @@
                         </a:rPr>
                         <a:t>Anshu Dubey, ANL</a:t>
                       </a:r>
-                    </a:p>
-                    <a:p>
-                      <a:pPr>
-                        <a:lnSpc>
-                          <a:spcPct val="100000"/>
-                        </a:lnSpc>
-                      </a:pPr>
-                      <a:endParaRPr lang="en-US" sz="1600" dirty="0"/>
                     </a:p>
                   </a:txBody>
                   <a:tcPr/>
@@ -10565,7 +10533,7 @@
           <p:cNvPr id="5" name="Group 4">
             <a:extLst>
               <a:ext uri="{FF2B5EF4-FFF2-40B4-BE49-F238E27FC236}">
-                <a16:creationId xmlns:a16="http://schemas.microsoft.com/office/drawing/2014/main" id="{809FFEAE-C12B-438A-B836-74C883AB9C0B}"/>
+                <a16:creationId xmlns:a16="http://schemas.microsoft.com/office/drawing/2014/main" id="{1E432556-E434-4E1C-BF45-B1AFC4484FCE}"/>
               </a:ext>
             </a:extLst>
           </p:cNvPr>
@@ -10585,7 +10553,7 @@
             <p:cNvPr id="6" name="Straight Connector 5">
               <a:extLst>
                 <a:ext uri="{FF2B5EF4-FFF2-40B4-BE49-F238E27FC236}">
-                  <a16:creationId xmlns:a16="http://schemas.microsoft.com/office/drawing/2014/main" id="{FD616130-498B-49A1-B567-D4EEE4169280}"/>
+                  <a16:creationId xmlns:a16="http://schemas.microsoft.com/office/drawing/2014/main" id="{9AA33DBE-3BD6-492A-8E9C-70D4DB3E9C16}"/>
                 </a:ext>
               </a:extLst>
             </p:cNvPr>
@@ -10626,7 +10594,7 @@
             <p:cNvPr id="7" name="Arrow: Right 7">
               <a:extLst>
                 <a:ext uri="{FF2B5EF4-FFF2-40B4-BE49-F238E27FC236}">
-                  <a16:creationId xmlns:a16="http://schemas.microsoft.com/office/drawing/2014/main" id="{C101D39A-EE8D-4630-8550-D66D60889E67}"/>
+                  <a16:creationId xmlns:a16="http://schemas.microsoft.com/office/drawing/2014/main" id="{957A1BD6-3A70-4C4B-AEC3-852CA4552EED}"/>
                 </a:ext>
               </a:extLst>
             </p:cNvPr>
@@ -10701,7 +10669,7 @@
             <p:cNvPr id="8" name="Arrow: Right 8">
               <a:extLst>
                 <a:ext uri="{FF2B5EF4-FFF2-40B4-BE49-F238E27FC236}">
-                  <a16:creationId xmlns:a16="http://schemas.microsoft.com/office/drawing/2014/main" id="{33F3DD26-6611-437C-9431-E9A118F1F3AB}"/>
+                  <a16:creationId xmlns:a16="http://schemas.microsoft.com/office/drawing/2014/main" id="{FE4BC733-9F58-4075-B4C7-73715C39DC54}"/>
                 </a:ext>
               </a:extLst>
             </p:cNvPr>
@@ -10775,7 +10743,7 @@
     </p:spTree>
     <p:extLst>
       <p:ext uri="{BB962C8B-B14F-4D97-AF65-F5344CB8AC3E}">
-        <p14:creationId xmlns:p14="http://schemas.microsoft.com/office/powerpoint/2010/main" val="1704785176"/>
+        <p14:creationId xmlns:p14="http://schemas.microsoft.com/office/powerpoint/2010/main" val="486240441"/>
       </p:ext>
     </p:extLst>
   </p:cSld>
@@ -10848,7 +10816,7 @@
         </p:nvGraphicFramePr>
         <p:xfrm>
           <a:off x="530679" y="879117"/>
-          <a:ext cx="11127467" cy="5770880"/>
+          <a:ext cx="11127467" cy="5562600"/>
         </p:xfrm>
         <a:graphic>
           <a:graphicData uri="http://schemas.openxmlformats.org/drawingml/2006/table">
@@ -11274,7 +11242,7 @@
                       </a:pPr>
                       <a:r>
                         <a:rPr lang="en-US" sz="1600" dirty="0"/>
-                        <a:t>Agile Project Management</a:t>
+                        <a:t>Agile Methodologies</a:t>
                       </a:r>
                     </a:p>
                   </a:txBody>
@@ -11933,7 +11901,7 @@
                       </a:pPr>
                       <a:r>
                         <a:rPr lang="en-US" sz="1600" i="0" dirty="0"/>
-                        <a:t>Quick Review</a:t>
+                        <a:t>Agile Methodologies Redux</a:t>
                       </a:r>
                     </a:p>
                   </a:txBody>
@@ -12061,14 +12029,6 @@
                         </a:rPr>
                         <a:t>Anshu Dubey, ANL</a:t>
                       </a:r>
-                    </a:p>
-                    <a:p>
-                      <a:pPr>
-                        <a:lnSpc>
-                          <a:spcPct val="100000"/>
-                        </a:lnSpc>
-                      </a:pPr>
-                      <a:endParaRPr lang="en-US" sz="1600" dirty="0"/>
                     </a:p>
                   </a:txBody>
                   <a:tcPr/>
@@ -12433,7 +12393,7 @@
           <p:cNvPr id="5" name="Group 4">
             <a:extLst>
               <a:ext uri="{FF2B5EF4-FFF2-40B4-BE49-F238E27FC236}">
-                <a16:creationId xmlns:a16="http://schemas.microsoft.com/office/drawing/2014/main" id="{809FFEAE-C12B-438A-B836-74C883AB9C0B}"/>
+                <a16:creationId xmlns:a16="http://schemas.microsoft.com/office/drawing/2014/main" id="{1E432556-E434-4E1C-BF45-B1AFC4484FCE}"/>
               </a:ext>
             </a:extLst>
           </p:cNvPr>
@@ -12442,7 +12402,7 @@
         </p:nvGrpSpPr>
         <p:grpSpPr>
           <a:xfrm>
-            <a:off x="79513" y="1782036"/>
+            <a:off x="79513" y="1782045"/>
             <a:ext cx="12029799" cy="390939"/>
             <a:chOff x="79513" y="1653208"/>
             <a:chExt cx="12029799" cy="390939"/>
@@ -12453,7 +12413,7 @@
             <p:cNvPr id="6" name="Straight Connector 5">
               <a:extLst>
                 <a:ext uri="{FF2B5EF4-FFF2-40B4-BE49-F238E27FC236}">
-                  <a16:creationId xmlns:a16="http://schemas.microsoft.com/office/drawing/2014/main" id="{FD616130-498B-49A1-B567-D4EEE4169280}"/>
+                  <a16:creationId xmlns:a16="http://schemas.microsoft.com/office/drawing/2014/main" id="{9AA33DBE-3BD6-492A-8E9C-70D4DB3E9C16}"/>
                 </a:ext>
               </a:extLst>
             </p:cNvPr>
@@ -12494,7 +12454,7 @@
             <p:cNvPr id="7" name="Arrow: Right 7">
               <a:extLst>
                 <a:ext uri="{FF2B5EF4-FFF2-40B4-BE49-F238E27FC236}">
-                  <a16:creationId xmlns:a16="http://schemas.microsoft.com/office/drawing/2014/main" id="{C101D39A-EE8D-4630-8550-D66D60889E67}"/>
+                  <a16:creationId xmlns:a16="http://schemas.microsoft.com/office/drawing/2014/main" id="{957A1BD6-3A70-4C4B-AEC3-852CA4552EED}"/>
                 </a:ext>
               </a:extLst>
             </p:cNvPr>
@@ -12569,7 +12529,7 @@
             <p:cNvPr id="8" name="Arrow: Right 8">
               <a:extLst>
                 <a:ext uri="{FF2B5EF4-FFF2-40B4-BE49-F238E27FC236}">
-                  <a16:creationId xmlns:a16="http://schemas.microsoft.com/office/drawing/2014/main" id="{33F3DD26-6611-437C-9431-E9A118F1F3AB}"/>
+                  <a16:creationId xmlns:a16="http://schemas.microsoft.com/office/drawing/2014/main" id="{FE4BC733-9F58-4075-B4C7-73715C39DC54}"/>
                 </a:ext>
               </a:extLst>
             </p:cNvPr>
@@ -12643,7 +12603,7 @@
     </p:spTree>
     <p:extLst>
       <p:ext uri="{BB962C8B-B14F-4D97-AF65-F5344CB8AC3E}">
-        <p14:creationId xmlns:p14="http://schemas.microsoft.com/office/powerpoint/2010/main" val="2423319845"/>
+        <p14:creationId xmlns:p14="http://schemas.microsoft.com/office/powerpoint/2010/main" val="112709212"/>
       </p:ext>
     </p:extLst>
   </p:cSld>
@@ -12716,7 +12676,7 @@
         </p:nvGraphicFramePr>
         <p:xfrm>
           <a:off x="530679" y="879117"/>
-          <a:ext cx="11127467" cy="5770880"/>
+          <a:ext cx="11127467" cy="5562600"/>
         </p:xfrm>
         <a:graphic>
           <a:graphicData uri="http://schemas.openxmlformats.org/drawingml/2006/table">
@@ -13142,7 +13102,7 @@
                       </a:pPr>
                       <a:r>
                         <a:rPr lang="en-US" sz="1600" dirty="0"/>
-                        <a:t>Agile Project Management</a:t>
+                        <a:t>Agile Methodologies</a:t>
                       </a:r>
                     </a:p>
                   </a:txBody>
@@ -13801,7 +13761,7 @@
                       </a:pPr>
                       <a:r>
                         <a:rPr lang="en-US" sz="1600" i="0" dirty="0"/>
-                        <a:t>Quick Review</a:t>
+                        <a:t>Agile Methodologies Redux</a:t>
                       </a:r>
                     </a:p>
                   </a:txBody>
@@ -13929,14 +13889,6 @@
                         </a:rPr>
                         <a:t>Anshu Dubey, ANL</a:t>
                       </a:r>
-                    </a:p>
-                    <a:p>
-                      <a:pPr>
-                        <a:lnSpc>
-                          <a:spcPct val="100000"/>
-                        </a:lnSpc>
-                      </a:pPr>
-                      <a:endParaRPr lang="en-US" sz="1600" dirty="0"/>
                     </a:p>
                   </a:txBody>
                   <a:tcPr/>
@@ -14301,7 +14253,7 @@
           <p:cNvPr id="5" name="Group 4">
             <a:extLst>
               <a:ext uri="{FF2B5EF4-FFF2-40B4-BE49-F238E27FC236}">
-                <a16:creationId xmlns:a16="http://schemas.microsoft.com/office/drawing/2014/main" id="{809FFEAE-C12B-438A-B836-74C883AB9C0B}"/>
+                <a16:creationId xmlns:a16="http://schemas.microsoft.com/office/drawing/2014/main" id="{1E432556-E434-4E1C-BF45-B1AFC4484FCE}"/>
               </a:ext>
             </a:extLst>
           </p:cNvPr>
@@ -14310,7 +14262,7 @@
         </p:nvGrpSpPr>
         <p:grpSpPr>
           <a:xfrm>
-            <a:off x="79513" y="2154099"/>
+            <a:off x="79513" y="2135185"/>
             <a:ext cx="12029799" cy="390939"/>
             <a:chOff x="79513" y="1653208"/>
             <a:chExt cx="12029799" cy="390939"/>
@@ -14321,7 +14273,7 @@
             <p:cNvPr id="6" name="Straight Connector 5">
               <a:extLst>
                 <a:ext uri="{FF2B5EF4-FFF2-40B4-BE49-F238E27FC236}">
-                  <a16:creationId xmlns:a16="http://schemas.microsoft.com/office/drawing/2014/main" id="{FD616130-498B-49A1-B567-D4EEE4169280}"/>
+                  <a16:creationId xmlns:a16="http://schemas.microsoft.com/office/drawing/2014/main" id="{9AA33DBE-3BD6-492A-8E9C-70D4DB3E9C16}"/>
                 </a:ext>
               </a:extLst>
             </p:cNvPr>
@@ -14362,7 +14314,7 @@
             <p:cNvPr id="7" name="Arrow: Right 7">
               <a:extLst>
                 <a:ext uri="{FF2B5EF4-FFF2-40B4-BE49-F238E27FC236}">
-                  <a16:creationId xmlns:a16="http://schemas.microsoft.com/office/drawing/2014/main" id="{C101D39A-EE8D-4630-8550-D66D60889E67}"/>
+                  <a16:creationId xmlns:a16="http://schemas.microsoft.com/office/drawing/2014/main" id="{957A1BD6-3A70-4C4B-AEC3-852CA4552EED}"/>
                 </a:ext>
               </a:extLst>
             </p:cNvPr>
@@ -14437,7 +14389,7 @@
             <p:cNvPr id="8" name="Arrow: Right 8">
               <a:extLst>
                 <a:ext uri="{FF2B5EF4-FFF2-40B4-BE49-F238E27FC236}">
-                  <a16:creationId xmlns:a16="http://schemas.microsoft.com/office/drawing/2014/main" id="{33F3DD26-6611-437C-9431-E9A118F1F3AB}"/>
+                  <a16:creationId xmlns:a16="http://schemas.microsoft.com/office/drawing/2014/main" id="{FE4BC733-9F58-4075-B4C7-73715C39DC54}"/>
                 </a:ext>
               </a:extLst>
             </p:cNvPr>
@@ -14511,7 +14463,7 @@
     </p:spTree>
     <p:extLst>
       <p:ext uri="{BB962C8B-B14F-4D97-AF65-F5344CB8AC3E}">
-        <p14:creationId xmlns:p14="http://schemas.microsoft.com/office/powerpoint/2010/main" val="1625069852"/>
+        <p14:creationId xmlns:p14="http://schemas.microsoft.com/office/powerpoint/2010/main" val="2546680696"/>
       </p:ext>
     </p:extLst>
   </p:cSld>
@@ -14584,7 +14536,7 @@
         </p:nvGraphicFramePr>
         <p:xfrm>
           <a:off x="530679" y="879117"/>
-          <a:ext cx="11127467" cy="5770880"/>
+          <a:ext cx="11127467" cy="5562600"/>
         </p:xfrm>
         <a:graphic>
           <a:graphicData uri="http://schemas.openxmlformats.org/drawingml/2006/table">
@@ -15010,7 +14962,7 @@
                       </a:pPr>
                       <a:r>
                         <a:rPr lang="en-US" sz="1600" dirty="0"/>
-                        <a:t>Agile Project Management</a:t>
+                        <a:t>Agile Methodologies</a:t>
                       </a:r>
                     </a:p>
                   </a:txBody>
@@ -15669,7 +15621,7 @@
                       </a:pPr>
                       <a:r>
                         <a:rPr lang="en-US" sz="1600" i="0" dirty="0"/>
-                        <a:t>Quick Review</a:t>
+                        <a:t>Agile Methodologies Redux</a:t>
                       </a:r>
                     </a:p>
                   </a:txBody>
@@ -15797,14 +15749,6 @@
                         </a:rPr>
                         <a:t>Anshu Dubey, ANL</a:t>
                       </a:r>
-                    </a:p>
-                    <a:p>
-                      <a:pPr>
-                        <a:lnSpc>
-                          <a:spcPct val="100000"/>
-                        </a:lnSpc>
-                      </a:pPr>
-                      <a:endParaRPr lang="en-US" sz="1600" dirty="0"/>
                     </a:p>
                   </a:txBody>
                   <a:tcPr/>
@@ -16169,7 +16113,7 @@
           <p:cNvPr id="5" name="Group 4">
             <a:extLst>
               <a:ext uri="{FF2B5EF4-FFF2-40B4-BE49-F238E27FC236}">
-                <a16:creationId xmlns:a16="http://schemas.microsoft.com/office/drawing/2014/main" id="{809FFEAE-C12B-438A-B836-74C883AB9C0B}"/>
+                <a16:creationId xmlns:a16="http://schemas.microsoft.com/office/drawing/2014/main" id="{1E432556-E434-4E1C-BF45-B1AFC4484FCE}"/>
               </a:ext>
             </a:extLst>
           </p:cNvPr>
@@ -16178,7 +16122,7 @@
         </p:nvGrpSpPr>
         <p:grpSpPr>
           <a:xfrm>
-            <a:off x="79513" y="2519870"/>
+            <a:off x="79513" y="2513566"/>
             <a:ext cx="12029799" cy="390939"/>
             <a:chOff x="79513" y="1653208"/>
             <a:chExt cx="12029799" cy="390939"/>
@@ -16189,7 +16133,7 @@
             <p:cNvPr id="6" name="Straight Connector 5">
               <a:extLst>
                 <a:ext uri="{FF2B5EF4-FFF2-40B4-BE49-F238E27FC236}">
-                  <a16:creationId xmlns:a16="http://schemas.microsoft.com/office/drawing/2014/main" id="{FD616130-498B-49A1-B567-D4EEE4169280}"/>
+                  <a16:creationId xmlns:a16="http://schemas.microsoft.com/office/drawing/2014/main" id="{9AA33DBE-3BD6-492A-8E9C-70D4DB3E9C16}"/>
                 </a:ext>
               </a:extLst>
             </p:cNvPr>
@@ -16230,7 +16174,7 @@
             <p:cNvPr id="7" name="Arrow: Right 7">
               <a:extLst>
                 <a:ext uri="{FF2B5EF4-FFF2-40B4-BE49-F238E27FC236}">
-                  <a16:creationId xmlns:a16="http://schemas.microsoft.com/office/drawing/2014/main" id="{C101D39A-EE8D-4630-8550-D66D60889E67}"/>
+                  <a16:creationId xmlns:a16="http://schemas.microsoft.com/office/drawing/2014/main" id="{957A1BD6-3A70-4C4B-AEC3-852CA4552EED}"/>
                 </a:ext>
               </a:extLst>
             </p:cNvPr>
@@ -16305,7 +16249,7 @@
             <p:cNvPr id="8" name="Arrow: Right 8">
               <a:extLst>
                 <a:ext uri="{FF2B5EF4-FFF2-40B4-BE49-F238E27FC236}">
-                  <a16:creationId xmlns:a16="http://schemas.microsoft.com/office/drawing/2014/main" id="{33F3DD26-6611-437C-9431-E9A118F1F3AB}"/>
+                  <a16:creationId xmlns:a16="http://schemas.microsoft.com/office/drawing/2014/main" id="{FE4BC733-9F58-4075-B4C7-73715C39DC54}"/>
                 </a:ext>
               </a:extLst>
             </p:cNvPr>
@@ -16379,7 +16323,7 @@
     </p:spTree>
     <p:extLst>
       <p:ext uri="{BB962C8B-B14F-4D97-AF65-F5344CB8AC3E}">
-        <p14:creationId xmlns:p14="http://schemas.microsoft.com/office/powerpoint/2010/main" val="2274169345"/>
+        <p14:creationId xmlns:p14="http://schemas.microsoft.com/office/powerpoint/2010/main" val="597522510"/>
       </p:ext>
     </p:extLst>
   </p:cSld>
@@ -16452,7 +16396,7 @@
         </p:nvGraphicFramePr>
         <p:xfrm>
           <a:off x="530679" y="879117"/>
-          <a:ext cx="11127467" cy="5770880"/>
+          <a:ext cx="11127467" cy="5562600"/>
         </p:xfrm>
         <a:graphic>
           <a:graphicData uri="http://schemas.openxmlformats.org/drawingml/2006/table">
@@ -16878,7 +16822,7 @@
                       </a:pPr>
                       <a:r>
                         <a:rPr lang="en-US" sz="1600" dirty="0"/>
-                        <a:t>Agile Project Management</a:t>
+                        <a:t>Agile Methodologies</a:t>
                       </a:r>
                     </a:p>
                   </a:txBody>
@@ -17537,7 +17481,7 @@
                       </a:pPr>
                       <a:r>
                         <a:rPr lang="en-US" sz="1600" i="0" dirty="0"/>
-                        <a:t>Quick Review</a:t>
+                        <a:t>Agile Methodologies Redux</a:t>
                       </a:r>
                     </a:p>
                   </a:txBody>
@@ -17665,14 +17609,6 @@
                         </a:rPr>
                         <a:t>Anshu Dubey, ANL</a:t>
                       </a:r>
-                    </a:p>
-                    <a:p>
-                      <a:pPr>
-                        <a:lnSpc>
-                          <a:spcPct val="100000"/>
-                        </a:lnSpc>
-                      </a:pPr>
-                      <a:endParaRPr lang="en-US" sz="1600" dirty="0"/>
                     </a:p>
                   </a:txBody>
                   <a:tcPr/>
@@ -18037,7 +17973,7 @@
           <p:cNvPr id="5" name="Group 4">
             <a:extLst>
               <a:ext uri="{FF2B5EF4-FFF2-40B4-BE49-F238E27FC236}">
-                <a16:creationId xmlns:a16="http://schemas.microsoft.com/office/drawing/2014/main" id="{809FFEAE-C12B-438A-B836-74C883AB9C0B}"/>
+                <a16:creationId xmlns:a16="http://schemas.microsoft.com/office/drawing/2014/main" id="{1E432556-E434-4E1C-BF45-B1AFC4484FCE}"/>
               </a:ext>
             </a:extLst>
           </p:cNvPr>
@@ -18046,7 +17982,7 @@
         </p:nvGrpSpPr>
         <p:grpSpPr>
           <a:xfrm>
-            <a:off x="79513" y="3232461"/>
+            <a:off x="79513" y="3257692"/>
             <a:ext cx="12029799" cy="390939"/>
             <a:chOff x="79513" y="1653208"/>
             <a:chExt cx="12029799" cy="390939"/>
@@ -18057,7 +17993,7 @@
             <p:cNvPr id="6" name="Straight Connector 5">
               <a:extLst>
                 <a:ext uri="{FF2B5EF4-FFF2-40B4-BE49-F238E27FC236}">
-                  <a16:creationId xmlns:a16="http://schemas.microsoft.com/office/drawing/2014/main" id="{FD616130-498B-49A1-B567-D4EEE4169280}"/>
+                  <a16:creationId xmlns:a16="http://schemas.microsoft.com/office/drawing/2014/main" id="{9AA33DBE-3BD6-492A-8E9C-70D4DB3E9C16}"/>
                 </a:ext>
               </a:extLst>
             </p:cNvPr>
@@ -18098,7 +18034,7 @@
             <p:cNvPr id="7" name="Arrow: Right 7">
               <a:extLst>
                 <a:ext uri="{FF2B5EF4-FFF2-40B4-BE49-F238E27FC236}">
-                  <a16:creationId xmlns:a16="http://schemas.microsoft.com/office/drawing/2014/main" id="{C101D39A-EE8D-4630-8550-D66D60889E67}"/>
+                  <a16:creationId xmlns:a16="http://schemas.microsoft.com/office/drawing/2014/main" id="{957A1BD6-3A70-4C4B-AEC3-852CA4552EED}"/>
                 </a:ext>
               </a:extLst>
             </p:cNvPr>
@@ -18173,7 +18109,7 @@
             <p:cNvPr id="8" name="Arrow: Right 8">
               <a:extLst>
                 <a:ext uri="{FF2B5EF4-FFF2-40B4-BE49-F238E27FC236}">
-                  <a16:creationId xmlns:a16="http://schemas.microsoft.com/office/drawing/2014/main" id="{33F3DD26-6611-437C-9431-E9A118F1F3AB}"/>
+                  <a16:creationId xmlns:a16="http://schemas.microsoft.com/office/drawing/2014/main" id="{FE4BC733-9F58-4075-B4C7-73715C39DC54}"/>
                 </a:ext>
               </a:extLst>
             </p:cNvPr>
@@ -18247,7 +18183,7 @@
     </p:spTree>
     <p:extLst>
       <p:ext uri="{BB962C8B-B14F-4D97-AF65-F5344CB8AC3E}">
-        <p14:creationId xmlns:p14="http://schemas.microsoft.com/office/powerpoint/2010/main" val="959313663"/>
+        <p14:creationId xmlns:p14="http://schemas.microsoft.com/office/powerpoint/2010/main" val="1292189669"/>
       </p:ext>
     </p:extLst>
   </p:cSld>
@@ -18320,7 +18256,7 @@
         </p:nvGraphicFramePr>
         <p:xfrm>
           <a:off x="530679" y="879117"/>
-          <a:ext cx="11127467" cy="5770880"/>
+          <a:ext cx="11127467" cy="5562600"/>
         </p:xfrm>
         <a:graphic>
           <a:graphicData uri="http://schemas.openxmlformats.org/drawingml/2006/table">
@@ -18746,7 +18682,7 @@
                       </a:pPr>
                       <a:r>
                         <a:rPr lang="en-US" sz="1600" dirty="0"/>
-                        <a:t>Agile Project Management</a:t>
+                        <a:t>Agile Methodologies</a:t>
                       </a:r>
                     </a:p>
                   </a:txBody>
@@ -19405,7 +19341,7 @@
                       </a:pPr>
                       <a:r>
                         <a:rPr lang="en-US" sz="1600" i="0" dirty="0"/>
-                        <a:t>Quick Review</a:t>
+                        <a:t>Agile Methodologies Redux</a:t>
                       </a:r>
                     </a:p>
                   </a:txBody>
@@ -19533,14 +19469,6 @@
                         </a:rPr>
                         <a:t>Anshu Dubey, ANL</a:t>
                       </a:r>
-                    </a:p>
-                    <a:p>
-                      <a:pPr>
-                        <a:lnSpc>
-                          <a:spcPct val="100000"/>
-                        </a:lnSpc>
-                      </a:pPr>
-                      <a:endParaRPr lang="en-US" sz="1600" dirty="0"/>
                     </a:p>
                   </a:txBody>
                   <a:tcPr/>
@@ -19905,7 +19833,7 @@
           <p:cNvPr id="5" name="Group 4">
             <a:extLst>
               <a:ext uri="{FF2B5EF4-FFF2-40B4-BE49-F238E27FC236}">
-                <a16:creationId xmlns:a16="http://schemas.microsoft.com/office/drawing/2014/main" id="{809FFEAE-C12B-438A-B836-74C883AB9C0B}"/>
+                <a16:creationId xmlns:a16="http://schemas.microsoft.com/office/drawing/2014/main" id="{1E432556-E434-4E1C-BF45-B1AFC4484FCE}"/>
               </a:ext>
             </a:extLst>
           </p:cNvPr>
@@ -19914,7 +19842,7 @@
         </p:nvGrpSpPr>
         <p:grpSpPr>
           <a:xfrm>
-            <a:off x="79513" y="3623447"/>
+            <a:off x="79513" y="3642372"/>
             <a:ext cx="12029799" cy="390939"/>
             <a:chOff x="79513" y="1653208"/>
             <a:chExt cx="12029799" cy="390939"/>
@@ -19925,7 +19853,7 @@
             <p:cNvPr id="6" name="Straight Connector 5">
               <a:extLst>
                 <a:ext uri="{FF2B5EF4-FFF2-40B4-BE49-F238E27FC236}">
-                  <a16:creationId xmlns:a16="http://schemas.microsoft.com/office/drawing/2014/main" id="{FD616130-498B-49A1-B567-D4EEE4169280}"/>
+                  <a16:creationId xmlns:a16="http://schemas.microsoft.com/office/drawing/2014/main" id="{9AA33DBE-3BD6-492A-8E9C-70D4DB3E9C16}"/>
                 </a:ext>
               </a:extLst>
             </p:cNvPr>
@@ -19966,7 +19894,7 @@
             <p:cNvPr id="7" name="Arrow: Right 7">
               <a:extLst>
                 <a:ext uri="{FF2B5EF4-FFF2-40B4-BE49-F238E27FC236}">
-                  <a16:creationId xmlns:a16="http://schemas.microsoft.com/office/drawing/2014/main" id="{C101D39A-EE8D-4630-8550-D66D60889E67}"/>
+                  <a16:creationId xmlns:a16="http://schemas.microsoft.com/office/drawing/2014/main" id="{957A1BD6-3A70-4C4B-AEC3-852CA4552EED}"/>
                 </a:ext>
               </a:extLst>
             </p:cNvPr>
@@ -20041,7 +19969,7 @@
             <p:cNvPr id="8" name="Arrow: Right 8">
               <a:extLst>
                 <a:ext uri="{FF2B5EF4-FFF2-40B4-BE49-F238E27FC236}">
-                  <a16:creationId xmlns:a16="http://schemas.microsoft.com/office/drawing/2014/main" id="{33F3DD26-6611-437C-9431-E9A118F1F3AB}"/>
+                  <a16:creationId xmlns:a16="http://schemas.microsoft.com/office/drawing/2014/main" id="{FE4BC733-9F58-4075-B4C7-73715C39DC54}"/>
                 </a:ext>
               </a:extLst>
             </p:cNvPr>
@@ -20115,7 +20043,7 @@
     </p:spTree>
     <p:extLst>
       <p:ext uri="{BB962C8B-B14F-4D97-AF65-F5344CB8AC3E}">
-        <p14:creationId xmlns:p14="http://schemas.microsoft.com/office/powerpoint/2010/main" val="537439748"/>
+        <p14:creationId xmlns:p14="http://schemas.microsoft.com/office/powerpoint/2010/main" val="567472013"/>
       </p:ext>
     </p:extLst>
   </p:cSld>
@@ -20188,7 +20116,7 @@
         </p:nvGraphicFramePr>
         <p:xfrm>
           <a:off x="530679" y="879117"/>
-          <a:ext cx="11127467" cy="5770880"/>
+          <a:ext cx="11127467" cy="5562600"/>
         </p:xfrm>
         <a:graphic>
           <a:graphicData uri="http://schemas.openxmlformats.org/drawingml/2006/table">
@@ -20614,7 +20542,7 @@
                       </a:pPr>
                       <a:r>
                         <a:rPr lang="en-US" sz="1600" dirty="0"/>
-                        <a:t>Agile Project Management</a:t>
+                        <a:t>Agile Methodologies</a:t>
                       </a:r>
                     </a:p>
                   </a:txBody>
@@ -21273,7 +21201,7 @@
                       </a:pPr>
                       <a:r>
                         <a:rPr lang="en-US" sz="1600" i="0" dirty="0"/>
-                        <a:t>Quick Review</a:t>
+                        <a:t>Agile Methodologies Redux</a:t>
                       </a:r>
                     </a:p>
                   </a:txBody>
@@ -21401,14 +21329,6 @@
                         </a:rPr>
                         <a:t>Anshu Dubey, ANL</a:t>
                       </a:r>
-                    </a:p>
-                    <a:p>
-                      <a:pPr>
-                        <a:lnSpc>
-                          <a:spcPct val="100000"/>
-                        </a:lnSpc>
-                      </a:pPr>
-                      <a:endParaRPr lang="en-US" sz="1600" dirty="0"/>
                     </a:p>
                   </a:txBody>
                   <a:tcPr/>
@@ -21773,7 +21693,7 @@
           <p:cNvPr id="5" name="Group 4">
             <a:extLst>
               <a:ext uri="{FF2B5EF4-FFF2-40B4-BE49-F238E27FC236}">
-                <a16:creationId xmlns:a16="http://schemas.microsoft.com/office/drawing/2014/main" id="{809FFEAE-C12B-438A-B836-74C883AB9C0B}"/>
+                <a16:creationId xmlns:a16="http://schemas.microsoft.com/office/drawing/2014/main" id="{1E432556-E434-4E1C-BF45-B1AFC4484FCE}"/>
               </a:ext>
             </a:extLst>
           </p:cNvPr>
@@ -21782,7 +21702,7 @@
         </p:nvGrpSpPr>
         <p:grpSpPr>
           <a:xfrm>
-            <a:off x="79513" y="4392810"/>
+            <a:off x="79513" y="4386506"/>
             <a:ext cx="12029799" cy="390939"/>
             <a:chOff x="79513" y="1653208"/>
             <a:chExt cx="12029799" cy="390939"/>
@@ -21793,7 +21713,7 @@
             <p:cNvPr id="6" name="Straight Connector 5">
               <a:extLst>
                 <a:ext uri="{FF2B5EF4-FFF2-40B4-BE49-F238E27FC236}">
-                  <a16:creationId xmlns:a16="http://schemas.microsoft.com/office/drawing/2014/main" id="{FD616130-498B-49A1-B567-D4EEE4169280}"/>
+                  <a16:creationId xmlns:a16="http://schemas.microsoft.com/office/drawing/2014/main" id="{9AA33DBE-3BD6-492A-8E9C-70D4DB3E9C16}"/>
                 </a:ext>
               </a:extLst>
             </p:cNvPr>
@@ -21834,7 +21754,7 @@
             <p:cNvPr id="7" name="Arrow: Right 7">
               <a:extLst>
                 <a:ext uri="{FF2B5EF4-FFF2-40B4-BE49-F238E27FC236}">
-                  <a16:creationId xmlns:a16="http://schemas.microsoft.com/office/drawing/2014/main" id="{C101D39A-EE8D-4630-8550-D66D60889E67}"/>
+                  <a16:creationId xmlns:a16="http://schemas.microsoft.com/office/drawing/2014/main" id="{957A1BD6-3A70-4C4B-AEC3-852CA4552EED}"/>
                 </a:ext>
               </a:extLst>
             </p:cNvPr>
@@ -21909,7 +21829,7 @@
             <p:cNvPr id="8" name="Arrow: Right 8">
               <a:extLst>
                 <a:ext uri="{FF2B5EF4-FFF2-40B4-BE49-F238E27FC236}">
-                  <a16:creationId xmlns:a16="http://schemas.microsoft.com/office/drawing/2014/main" id="{33F3DD26-6611-437C-9431-E9A118F1F3AB}"/>
+                  <a16:creationId xmlns:a16="http://schemas.microsoft.com/office/drawing/2014/main" id="{FE4BC733-9F58-4075-B4C7-73715C39DC54}"/>
                 </a:ext>
               </a:extLst>
             </p:cNvPr>
@@ -21983,7 +21903,7 @@
     </p:spTree>
     <p:extLst>
       <p:ext uri="{BB962C8B-B14F-4D97-AF65-F5344CB8AC3E}">
-        <p14:creationId xmlns:p14="http://schemas.microsoft.com/office/powerpoint/2010/main" val="4133924122"/>
+        <p14:creationId xmlns:p14="http://schemas.microsoft.com/office/powerpoint/2010/main" val="1081441623"/>
       </p:ext>
     </p:extLst>
   </p:cSld>
@@ -22056,7 +21976,7 @@
         </p:nvGraphicFramePr>
         <p:xfrm>
           <a:off x="530679" y="879117"/>
-          <a:ext cx="11127467" cy="5770880"/>
+          <a:ext cx="11127467" cy="5562600"/>
         </p:xfrm>
         <a:graphic>
           <a:graphicData uri="http://schemas.openxmlformats.org/drawingml/2006/table">
@@ -22482,7 +22402,7 @@
                       </a:pPr>
                       <a:r>
                         <a:rPr lang="en-US" sz="1600" dirty="0"/>
-                        <a:t>Agile Project Management</a:t>
+                        <a:t>Agile Methodologies</a:t>
                       </a:r>
                     </a:p>
                   </a:txBody>
@@ -23141,7 +23061,7 @@
                       </a:pPr>
                       <a:r>
                         <a:rPr lang="en-US" sz="1600" i="0" dirty="0"/>
-                        <a:t>Quick Review</a:t>
+                        <a:t>Agile Methodologies Redux</a:t>
                       </a:r>
                     </a:p>
                   </a:txBody>
@@ -23269,14 +23189,6 @@
                         </a:rPr>
                         <a:t>Anshu Dubey, ANL</a:t>
                       </a:r>
-                    </a:p>
-                    <a:p>
-                      <a:pPr>
-                        <a:lnSpc>
-                          <a:spcPct val="100000"/>
-                        </a:lnSpc>
-                      </a:pPr>
-                      <a:endParaRPr lang="en-US" sz="1600" dirty="0"/>
                     </a:p>
                   </a:txBody>
                   <a:tcPr/>
@@ -23641,7 +23553,7 @@
           <p:cNvPr id="5" name="Group 4">
             <a:extLst>
               <a:ext uri="{FF2B5EF4-FFF2-40B4-BE49-F238E27FC236}">
-                <a16:creationId xmlns:a16="http://schemas.microsoft.com/office/drawing/2014/main" id="{809FFEAE-C12B-438A-B836-74C883AB9C0B}"/>
+                <a16:creationId xmlns:a16="http://schemas.microsoft.com/office/drawing/2014/main" id="{1E432556-E434-4E1C-BF45-B1AFC4484FCE}"/>
               </a:ext>
             </a:extLst>
           </p:cNvPr>
@@ -23650,7 +23562,7 @@
         </p:nvGrpSpPr>
         <p:grpSpPr>
           <a:xfrm>
-            <a:off x="79513" y="4916224"/>
+            <a:off x="79513" y="4745958"/>
             <a:ext cx="12029799" cy="390939"/>
             <a:chOff x="79513" y="1653208"/>
             <a:chExt cx="12029799" cy="390939"/>
@@ -23661,7 +23573,7 @@
             <p:cNvPr id="6" name="Straight Connector 5">
               <a:extLst>
                 <a:ext uri="{FF2B5EF4-FFF2-40B4-BE49-F238E27FC236}">
-                  <a16:creationId xmlns:a16="http://schemas.microsoft.com/office/drawing/2014/main" id="{FD616130-498B-49A1-B567-D4EEE4169280}"/>
+                  <a16:creationId xmlns:a16="http://schemas.microsoft.com/office/drawing/2014/main" id="{9AA33DBE-3BD6-492A-8E9C-70D4DB3E9C16}"/>
                 </a:ext>
               </a:extLst>
             </p:cNvPr>
@@ -23702,7 +23614,7 @@
             <p:cNvPr id="7" name="Arrow: Right 7">
               <a:extLst>
                 <a:ext uri="{FF2B5EF4-FFF2-40B4-BE49-F238E27FC236}">
-                  <a16:creationId xmlns:a16="http://schemas.microsoft.com/office/drawing/2014/main" id="{C101D39A-EE8D-4630-8550-D66D60889E67}"/>
+                  <a16:creationId xmlns:a16="http://schemas.microsoft.com/office/drawing/2014/main" id="{957A1BD6-3A70-4C4B-AEC3-852CA4552EED}"/>
                 </a:ext>
               </a:extLst>
             </p:cNvPr>
@@ -23777,7 +23689,7 @@
             <p:cNvPr id="8" name="Arrow: Right 8">
               <a:extLst>
                 <a:ext uri="{FF2B5EF4-FFF2-40B4-BE49-F238E27FC236}">
-                  <a16:creationId xmlns:a16="http://schemas.microsoft.com/office/drawing/2014/main" id="{33F3DD26-6611-437C-9431-E9A118F1F3AB}"/>
+                  <a16:creationId xmlns:a16="http://schemas.microsoft.com/office/drawing/2014/main" id="{FE4BC733-9F58-4075-B4C7-73715C39DC54}"/>
                 </a:ext>
               </a:extLst>
             </p:cNvPr>
@@ -23851,7 +23763,7 @@
     </p:spTree>
     <p:extLst>
       <p:ext uri="{BB962C8B-B14F-4D97-AF65-F5344CB8AC3E}">
-        <p14:creationId xmlns:p14="http://schemas.microsoft.com/office/powerpoint/2010/main" val="1405591557"/>
+        <p14:creationId xmlns:p14="http://schemas.microsoft.com/office/powerpoint/2010/main" val="3792568314"/>
       </p:ext>
     </p:extLst>
   </p:cSld>
@@ -24823,18 +24735,18 @@
 </file>
 
 <file path=customXml/item2.xml><?xml version="1.0" encoding="utf-8"?>
+<p:properties xmlns:p="http://schemas.microsoft.com/office/2006/metadata/properties" xmlns:xsi="http://www.w3.org/2001/XMLSchema-instance" xmlns:pc="http://schemas.microsoft.com/office/infopath/2007/PartnerControls">
+  <documentManagement/>
+</p:properties>
+</file>
+
+<file path=customXml/item3.xml><?xml version="1.0" encoding="utf-8"?>
 <?mso-contentType ?>
 <FormTemplates xmlns="http://schemas.microsoft.com/sharepoint/v3/contenttype/forms">
   <Display>DocumentLibraryForm</Display>
   <Edit>DocumentLibraryForm</Edit>
   <New>DocumentLibraryForm</New>
 </FormTemplates>
-</file>
-
-<file path=customXml/item3.xml><?xml version="1.0" encoding="utf-8"?>
-<p:properties xmlns:p="http://schemas.microsoft.com/office/2006/metadata/properties" xmlns:xsi="http://www.w3.org/2001/XMLSchema-instance" xmlns:pc="http://schemas.microsoft.com/office/infopath/2007/PartnerControls">
-  <documentManagement/>
-</p:properties>
 </file>
 
 <file path=customXml/itemProps1.xml><?xml version="1.0" encoding="utf-8"?>
@@ -24853,14 +24765,6 @@
 </file>
 
 <file path=customXml/itemProps2.xml><?xml version="1.0" encoding="utf-8"?>
-<ds:datastoreItem xmlns:ds="http://schemas.openxmlformats.org/officeDocument/2006/customXml" ds:itemID="{19E20559-B232-4371-8690-E3D8007EDB82}">
-  <ds:schemaRefs>
-    <ds:schemaRef ds:uri="http://schemas.microsoft.com/sharepoint/v3/contenttype/forms"/>
-  </ds:schemaRefs>
-</ds:datastoreItem>
-</file>
-
-<file path=customXml/itemProps3.xml><?xml version="1.0" encoding="utf-8"?>
 <ds:datastoreItem xmlns:ds="http://schemas.openxmlformats.org/officeDocument/2006/customXml" ds:itemID="{A50EC660-24D0-43A0-AE5E-E274115E726B}">
   <ds:schemaRefs>
     <ds:schemaRef ds:uri="http://purl.org/dc/elements/1.1/"/>
@@ -24873,4 +24777,12 @@
     <ds:schemaRef ds:uri="http://schemas.microsoft.com/office/infopath/2007/PartnerControls"/>
   </ds:schemaRefs>
 </ds:datastoreItem>
+</file>
+
+<file path=customXml/itemProps3.xml><?xml version="1.0" encoding="utf-8"?>
+<ds:datastoreItem xmlns:ds="http://schemas.openxmlformats.org/officeDocument/2006/customXml" ds:itemID="{19E20559-B232-4371-8690-E3D8007EDB82}">
+  <ds:schemaRefs>
+    <ds:schemaRef ds:uri="http://schemas.microsoft.com/sharepoint/v3/contenttype/forms"/>
+  </ds:schemaRefs>
+</ds:datastoreItem>
 </file>
</xml_diff>